<commit_message>
fix: fix explanation ppt and pdf
</commit_message>
<xml_diff>
--- a/Explanation.pptx
+++ b/Explanation.pptx
@@ -14,22 +14,21 @@
     <p:sldId id="262" r:id="rId8"/>
     <p:sldId id="263" r:id="rId9"/>
     <p:sldId id="264" r:id="rId10"/>
-    <p:sldId id="265" r:id="rId11"/>
-    <p:sldId id="266" r:id="rId12"/>
-    <p:sldId id="267" r:id="rId13"/>
-    <p:sldId id="268" r:id="rId14"/>
-    <p:sldId id="269" r:id="rId15"/>
-    <p:sldId id="270" r:id="rId16"/>
-    <p:sldId id="271" r:id="rId17"/>
-    <p:sldId id="273" r:id="rId18"/>
-    <p:sldId id="274" r:id="rId19"/>
-    <p:sldId id="275" r:id="rId20"/>
-    <p:sldId id="276" r:id="rId21"/>
-    <p:sldId id="277" r:id="rId22"/>
-    <p:sldId id="278" r:id="rId23"/>
-    <p:sldId id="279" r:id="rId24"/>
-    <p:sldId id="280" r:id="rId25"/>
-    <p:sldId id="272" r:id="rId26"/>
+    <p:sldId id="266" r:id="rId11"/>
+    <p:sldId id="267" r:id="rId12"/>
+    <p:sldId id="268" r:id="rId13"/>
+    <p:sldId id="269" r:id="rId14"/>
+    <p:sldId id="270" r:id="rId15"/>
+    <p:sldId id="271" r:id="rId16"/>
+    <p:sldId id="273" r:id="rId17"/>
+    <p:sldId id="274" r:id="rId18"/>
+    <p:sldId id="275" r:id="rId19"/>
+    <p:sldId id="276" r:id="rId20"/>
+    <p:sldId id="277" r:id="rId21"/>
+    <p:sldId id="278" r:id="rId22"/>
+    <p:sldId id="279" r:id="rId23"/>
+    <p:sldId id="280" r:id="rId24"/>
+    <p:sldId id="272" r:id="rId25"/>
   </p:sldIdLst>
   <p:sldSz cx="12192000" cy="6858000"/>
   <p:notesSz cx="6858000" cy="9144000"/>
@@ -128,6 +127,11 @@
       </a:defRPr>
     </a:lvl9pPr>
   </p:defaultTextStyle>
+  <p:extLst>
+    <p:ext uri="{EFAFB233-063F-42B5-8137-9DF3F51BA10A}">
+      <p15:sldGuideLst xmlns:p15="http://schemas.microsoft.com/office/powerpoint/2012/main"/>
+    </p:ext>
+  </p:extLst>
 </p:presentation>
 </file>
 
@@ -280,7 +284,7 @@
           <a:p>
             <a:fld id="{687E499A-9857-A744-B85A-4EA29AD2EA1C}" type="datetimeFigureOut">
               <a:rPr lang="en-US" smtClean="0"/>
-              <a:t>12/8/24</a:t>
+              <a:t>2/23/25</a:t>
             </a:fld>
             <a:endParaRPr lang="en-US"/>
           </a:p>
@@ -480,7 +484,7 @@
           <a:p>
             <a:fld id="{687E499A-9857-A744-B85A-4EA29AD2EA1C}" type="datetimeFigureOut">
               <a:rPr lang="en-US" smtClean="0"/>
-              <a:t>12/8/24</a:t>
+              <a:t>2/23/25</a:t>
             </a:fld>
             <a:endParaRPr lang="en-US"/>
           </a:p>
@@ -690,7 +694,7 @@
           <a:p>
             <a:fld id="{687E499A-9857-A744-B85A-4EA29AD2EA1C}" type="datetimeFigureOut">
               <a:rPr lang="en-US" smtClean="0"/>
-              <a:t>12/8/24</a:t>
+              <a:t>2/23/25</a:t>
             </a:fld>
             <a:endParaRPr lang="en-US"/>
           </a:p>
@@ -890,7 +894,7 @@
           <a:p>
             <a:fld id="{687E499A-9857-A744-B85A-4EA29AD2EA1C}" type="datetimeFigureOut">
               <a:rPr lang="en-US" smtClean="0"/>
-              <a:t>12/8/24</a:t>
+              <a:t>2/23/25</a:t>
             </a:fld>
             <a:endParaRPr lang="en-US"/>
           </a:p>
@@ -1166,7 +1170,7 @@
           <a:p>
             <a:fld id="{687E499A-9857-A744-B85A-4EA29AD2EA1C}" type="datetimeFigureOut">
               <a:rPr lang="en-US" smtClean="0"/>
-              <a:t>12/8/24</a:t>
+              <a:t>2/23/25</a:t>
             </a:fld>
             <a:endParaRPr lang="en-US"/>
           </a:p>
@@ -1434,7 +1438,7 @@
           <a:p>
             <a:fld id="{687E499A-9857-A744-B85A-4EA29AD2EA1C}" type="datetimeFigureOut">
               <a:rPr lang="en-US" smtClean="0"/>
-              <a:t>12/8/24</a:t>
+              <a:t>2/23/25</a:t>
             </a:fld>
             <a:endParaRPr lang="en-US"/>
           </a:p>
@@ -1849,7 +1853,7 @@
           <a:p>
             <a:fld id="{687E499A-9857-A744-B85A-4EA29AD2EA1C}" type="datetimeFigureOut">
               <a:rPr lang="en-US" smtClean="0"/>
-              <a:t>12/8/24</a:t>
+              <a:t>2/23/25</a:t>
             </a:fld>
             <a:endParaRPr lang="en-US"/>
           </a:p>
@@ -1991,7 +1995,7 @@
           <a:p>
             <a:fld id="{687E499A-9857-A744-B85A-4EA29AD2EA1C}" type="datetimeFigureOut">
               <a:rPr lang="en-US" smtClean="0"/>
-              <a:t>12/8/24</a:t>
+              <a:t>2/23/25</a:t>
             </a:fld>
             <a:endParaRPr lang="en-US"/>
           </a:p>
@@ -2104,7 +2108,7 @@
           <a:p>
             <a:fld id="{687E499A-9857-A744-B85A-4EA29AD2EA1C}" type="datetimeFigureOut">
               <a:rPr lang="en-US" smtClean="0"/>
-              <a:t>12/8/24</a:t>
+              <a:t>2/23/25</a:t>
             </a:fld>
             <a:endParaRPr lang="en-US"/>
           </a:p>
@@ -2417,7 +2421,7 @@
           <a:p>
             <a:fld id="{687E499A-9857-A744-B85A-4EA29AD2EA1C}" type="datetimeFigureOut">
               <a:rPr lang="en-US" smtClean="0"/>
-              <a:t>12/8/24</a:t>
+              <a:t>2/23/25</a:t>
             </a:fld>
             <a:endParaRPr lang="en-US"/>
           </a:p>
@@ -2706,7 +2710,7 @@
           <a:p>
             <a:fld id="{687E499A-9857-A744-B85A-4EA29AD2EA1C}" type="datetimeFigureOut">
               <a:rPr lang="en-US" smtClean="0"/>
-              <a:t>12/8/24</a:t>
+              <a:t>2/23/25</a:t>
             </a:fld>
             <a:endParaRPr lang="en-US"/>
           </a:p>
@@ -2949,7 +2953,7 @@
           <a:p>
             <a:fld id="{687E499A-9857-A744-B85A-4EA29AD2EA1C}" type="datetimeFigureOut">
               <a:rPr lang="en-US" smtClean="0"/>
-              <a:t>12/8/24</a:t>
+              <a:t>2/23/25</a:t>
             </a:fld>
             <a:endParaRPr lang="en-US"/>
           </a:p>
@@ -3458,130 +3462,6 @@
 </file>
 
 <file path=ppt/slides/slide10.xml><?xml version="1.0" encoding="utf-8"?>
-<p:sld xmlns:a="http://schemas.openxmlformats.org/drawingml/2006/main" xmlns:r="http://schemas.openxmlformats.org/officeDocument/2006/relationships" xmlns:p="http://schemas.openxmlformats.org/presentationml/2006/main">
-  <p:cSld>
-    <p:spTree>
-      <p:nvGrpSpPr>
-        <p:cNvPr id="1" name=""/>
-        <p:cNvGrpSpPr/>
-        <p:nvPr/>
-      </p:nvGrpSpPr>
-      <p:grpSpPr>
-        <a:xfrm>
-          <a:off x="0" y="0"/>
-          <a:ext cx="0" cy="0"/>
-          <a:chOff x="0" y="0"/>
-          <a:chExt cx="0" cy="0"/>
-        </a:xfrm>
-      </p:grpSpPr>
-      <p:sp>
-        <p:nvSpPr>
-          <p:cNvPr id="2" name="Title 1">
-            <a:extLst>
-              <a:ext uri="{FF2B5EF4-FFF2-40B4-BE49-F238E27FC236}">
-                <a16:creationId xmlns:a16="http://schemas.microsoft.com/office/drawing/2014/main" id="{71190D8A-E90E-45DF-0D09-2EAB9F5ADE6D}"/>
-              </a:ext>
-            </a:extLst>
-          </p:cNvPr>
-          <p:cNvSpPr>
-            <a:spLocks noGrp="1"/>
-          </p:cNvSpPr>
-          <p:nvPr>
-            <p:ph type="title"/>
-          </p:nvPr>
-        </p:nvSpPr>
-        <p:spPr/>
-        <p:txBody>
-          <a:bodyPr/>
-          <a:lstStyle/>
-          <a:p>
-            <a:r>
-              <a:rPr lang="en-US" b="1" dirty="0"/>
-              <a:t>Features</a:t>
-            </a:r>
-          </a:p>
-        </p:txBody>
-      </p:sp>
-      <p:sp>
-        <p:nvSpPr>
-          <p:cNvPr id="3" name="Content Placeholder 2">
-            <a:extLst>
-              <a:ext uri="{FF2B5EF4-FFF2-40B4-BE49-F238E27FC236}">
-                <a16:creationId xmlns:a16="http://schemas.microsoft.com/office/drawing/2014/main" id="{7B2F0EBD-B545-FBF9-D946-21BDABEAD1EC}"/>
-              </a:ext>
-            </a:extLst>
-          </p:cNvPr>
-          <p:cNvSpPr>
-            <a:spLocks noGrp="1"/>
-          </p:cNvSpPr>
-          <p:nvPr>
-            <p:ph idx="1"/>
-          </p:nvPr>
-        </p:nvSpPr>
-        <p:spPr/>
-        <p:txBody>
-          <a:bodyPr>
-            <a:normAutofit/>
-          </a:bodyPr>
-          <a:lstStyle/>
-          <a:p>
-            <a:pPr marL="0" indent="0">
-              <a:buNone/>
-            </a:pPr>
-            <a:r>
-              <a:rPr lang="en-US" dirty="0">
-                <a:latin typeface="Calibri" panose="020F0502020204030204" pitchFamily="34" charset="0"/>
-                <a:cs typeface="Calibri" panose="020F0502020204030204" pitchFamily="34" charset="0"/>
-              </a:rPr>
-              <a:t>11. </a:t>
-            </a:r>
-            <a:r>
-              <a:rPr lang="en-MY" dirty="0">
-                <a:effectLst/>
-                <a:latin typeface="Calibri" panose="020F0502020204030204" pitchFamily="34" charset="0"/>
-                <a:cs typeface="Calibri" panose="020F0502020204030204" pitchFamily="34" charset="0"/>
-              </a:rPr>
-              <a:t>Data Privacy</a:t>
-            </a:r>
-          </a:p>
-          <a:p>
-            <a:pPr lvl="1"/>
-            <a:r>
-              <a:rPr lang="en-MY" b="0" dirty="0">
-                <a:effectLst/>
-                <a:latin typeface="Calibri" panose="020F0502020204030204" pitchFamily="34" charset="0"/>
-                <a:cs typeface="Calibri" panose="020F0502020204030204" pitchFamily="34" charset="0"/>
-              </a:rPr>
-              <a:t>Guardrail request on other user’s data.</a:t>
-            </a:r>
-          </a:p>
-          <a:p>
-            <a:pPr lvl="2"/>
-            <a:r>
-              <a:rPr lang="en-MY" b="0" dirty="0">
-                <a:effectLst/>
-                <a:latin typeface="Calibri" panose="020F0502020204030204" pitchFamily="34" charset="0"/>
-                <a:cs typeface="Calibri" panose="020F0502020204030204" pitchFamily="34" charset="0"/>
-              </a:rPr>
-              <a:t>Example: “For privacy reasons, I can only provide insights based on your data. Would you like help understanding trends in your transactions instead?”</a:t>
-            </a:r>
-          </a:p>
-        </p:txBody>
-      </p:sp>
-    </p:spTree>
-    <p:extLst>
-      <p:ext uri="{BB962C8B-B14F-4D97-AF65-F5344CB8AC3E}">
-        <p14:creationId xmlns:p14="http://schemas.microsoft.com/office/powerpoint/2010/main" val="2820448934"/>
-      </p:ext>
-    </p:extLst>
-  </p:cSld>
-  <p:clrMapOvr>
-    <a:masterClrMapping/>
-  </p:clrMapOvr>
-</p:sld>
-</file>
-
-<file path=ppt/slides/slide11.xml><?xml version="1.0" encoding="utf-8"?>
 <p:sld xmlns:a="http://schemas.openxmlformats.org/drawingml/2006/main" xmlns:r="http://schemas.openxmlformats.org/officeDocument/2006/relationships" xmlns:p="http://schemas.openxmlformats.org/presentationml/2006/main">
   <p:cSld>
     <p:spTree>
@@ -4322,7 +4202,7 @@
 </p:sld>
 </file>
 
-<file path=ppt/slides/slide12.xml><?xml version="1.0" encoding="utf-8"?>
+<file path=ppt/slides/slide11.xml><?xml version="1.0" encoding="utf-8"?>
 <p:sld xmlns:a="http://schemas.openxmlformats.org/drawingml/2006/main" xmlns:r="http://schemas.openxmlformats.org/officeDocument/2006/relationships" xmlns:p="http://schemas.openxmlformats.org/presentationml/2006/main">
   <p:cSld>
     <p:spTree>
@@ -4984,7 +4864,7 @@
 </p:sld>
 </file>
 
-<file path=ppt/slides/slide13.xml><?xml version="1.0" encoding="utf-8"?>
+<file path=ppt/slides/slide12.xml><?xml version="1.0" encoding="utf-8"?>
 <p:sld xmlns:a="http://schemas.openxmlformats.org/drawingml/2006/main" xmlns:r="http://schemas.openxmlformats.org/officeDocument/2006/relationships" xmlns:p="http://schemas.openxmlformats.org/presentationml/2006/main">
   <p:cSld>
     <p:spTree>
@@ -5134,7 +5014,7 @@
 </p:sld>
 </file>
 
-<file path=ppt/slides/slide14.xml><?xml version="1.0" encoding="utf-8"?>
+<file path=ppt/slides/slide13.xml><?xml version="1.0" encoding="utf-8"?>
 <p:sld xmlns:a="http://schemas.openxmlformats.org/drawingml/2006/main" xmlns:r="http://schemas.openxmlformats.org/officeDocument/2006/relationships" xmlns:p="http://schemas.openxmlformats.org/presentationml/2006/main">
   <p:cSld>
     <p:spTree>
@@ -5281,7 +5161,7 @@
 </p:sld>
 </file>
 
-<file path=ppt/slides/slide15.xml><?xml version="1.0" encoding="utf-8"?>
+<file path=ppt/slides/slide14.xml><?xml version="1.0" encoding="utf-8"?>
 <p:sld xmlns:a="http://schemas.openxmlformats.org/drawingml/2006/main" xmlns:r="http://schemas.openxmlformats.org/officeDocument/2006/relationships" xmlns:p="http://schemas.openxmlformats.org/presentationml/2006/main">
   <p:cSld>
     <p:spTree>
@@ -5435,7 +5315,7 @@
 </p:sld>
 </file>
 
-<file path=ppt/slides/slide16.xml><?xml version="1.0" encoding="utf-8"?>
+<file path=ppt/slides/slide15.xml><?xml version="1.0" encoding="utf-8"?>
 <p:sld xmlns:a="http://schemas.openxmlformats.org/drawingml/2006/main" xmlns:r="http://schemas.openxmlformats.org/officeDocument/2006/relationships" xmlns:p="http://schemas.openxmlformats.org/presentationml/2006/main">
   <p:cSld>
     <p:spTree>
@@ -5750,7 +5630,7 @@
 </p:sld>
 </file>
 
-<file path=ppt/slides/slide17.xml><?xml version="1.0" encoding="utf-8"?>
+<file path=ppt/slides/slide16.xml><?xml version="1.0" encoding="utf-8"?>
 <p:sld xmlns:a="http://schemas.openxmlformats.org/drawingml/2006/main" xmlns:r="http://schemas.openxmlformats.org/officeDocument/2006/relationships" xmlns:p="http://schemas.openxmlformats.org/presentationml/2006/main">
   <p:cSld>
     <p:spTree>
@@ -5868,7 +5748,7 @@
 </p:sld>
 </file>
 
-<file path=ppt/slides/slide18.xml><?xml version="1.0" encoding="utf-8"?>
+<file path=ppt/slides/slide17.xml><?xml version="1.0" encoding="utf-8"?>
 <p:sld xmlns:a="http://schemas.openxmlformats.org/drawingml/2006/main" xmlns:r="http://schemas.openxmlformats.org/officeDocument/2006/relationships" xmlns:p="http://schemas.openxmlformats.org/presentationml/2006/main">
   <p:cSld>
     <p:spTree>
@@ -5986,7 +5866,7 @@
 </p:sld>
 </file>
 
-<file path=ppt/slides/slide19.xml><?xml version="1.0" encoding="utf-8"?>
+<file path=ppt/slides/slide18.xml><?xml version="1.0" encoding="utf-8"?>
 <p:sld xmlns:a="http://schemas.openxmlformats.org/drawingml/2006/main" xmlns:r="http://schemas.openxmlformats.org/officeDocument/2006/relationships" xmlns:p="http://schemas.openxmlformats.org/presentationml/2006/main">
   <p:cSld>
     <p:spTree>
@@ -6104,129 +5984,7 @@
 </p:sld>
 </file>
 
-<file path=ppt/slides/slide2.xml><?xml version="1.0" encoding="utf-8"?>
-<p:sld xmlns:a="http://schemas.openxmlformats.org/drawingml/2006/main" xmlns:r="http://schemas.openxmlformats.org/officeDocument/2006/relationships" xmlns:p="http://schemas.openxmlformats.org/presentationml/2006/main">
-  <p:cSld>
-    <p:spTree>
-      <p:nvGrpSpPr>
-        <p:cNvPr id="1" name=""/>
-        <p:cNvGrpSpPr/>
-        <p:nvPr/>
-      </p:nvGrpSpPr>
-      <p:grpSpPr>
-        <a:xfrm>
-          <a:off x="0" y="0"/>
-          <a:ext cx="0" cy="0"/>
-          <a:chOff x="0" y="0"/>
-          <a:chExt cx="0" cy="0"/>
-        </a:xfrm>
-      </p:grpSpPr>
-      <p:sp>
-        <p:nvSpPr>
-          <p:cNvPr id="2" name="Title 1">
-            <a:extLst>
-              <a:ext uri="{FF2B5EF4-FFF2-40B4-BE49-F238E27FC236}">
-                <a16:creationId xmlns:a16="http://schemas.microsoft.com/office/drawing/2014/main" id="{4B46E646-7500-CBFB-037A-9EB81193E760}"/>
-              </a:ext>
-            </a:extLst>
-          </p:cNvPr>
-          <p:cNvSpPr>
-            <a:spLocks noGrp="1"/>
-          </p:cNvSpPr>
-          <p:nvPr>
-            <p:ph type="title"/>
-          </p:nvPr>
-        </p:nvSpPr>
-        <p:spPr/>
-        <p:txBody>
-          <a:bodyPr/>
-          <a:lstStyle/>
-          <a:p>
-            <a:r>
-              <a:rPr lang="en-US" b="1" dirty="0"/>
-              <a:t>Table of content</a:t>
-            </a:r>
-          </a:p>
-        </p:txBody>
-      </p:sp>
-      <p:sp>
-        <p:nvSpPr>
-          <p:cNvPr id="3" name="Content Placeholder 2">
-            <a:extLst>
-              <a:ext uri="{FF2B5EF4-FFF2-40B4-BE49-F238E27FC236}">
-                <a16:creationId xmlns:a16="http://schemas.microsoft.com/office/drawing/2014/main" id="{3CF7D359-EB74-53EC-4131-DBBAA570D528}"/>
-              </a:ext>
-            </a:extLst>
-          </p:cNvPr>
-          <p:cNvSpPr>
-            <a:spLocks noGrp="1"/>
-          </p:cNvSpPr>
-          <p:nvPr>
-            <p:ph idx="1"/>
-          </p:nvPr>
-        </p:nvSpPr>
-        <p:spPr/>
-        <p:txBody>
-          <a:bodyPr/>
-          <a:lstStyle/>
-          <a:p>
-            <a:r>
-              <a:rPr lang="en-US" dirty="0"/>
-              <a:t>Understanding the Problem</a:t>
-            </a:r>
-          </a:p>
-          <a:p>
-            <a:r>
-              <a:rPr lang="en-US" dirty="0"/>
-              <a:t>Scope</a:t>
-            </a:r>
-          </a:p>
-          <a:p>
-            <a:r>
-              <a:rPr lang="en-US" dirty="0"/>
-              <a:t>Features</a:t>
-            </a:r>
-          </a:p>
-          <a:p>
-            <a:r>
-              <a:rPr lang="en-US" dirty="0"/>
-              <a:t>Architecture</a:t>
-            </a:r>
-          </a:p>
-          <a:p>
-            <a:r>
-              <a:rPr lang="en-US" dirty="0"/>
-              <a:t>Prompt Engineering</a:t>
-            </a:r>
-          </a:p>
-          <a:p>
-            <a:r>
-              <a:rPr lang="en-US" dirty="0"/>
-              <a:t>Demo</a:t>
-            </a:r>
-          </a:p>
-          <a:p>
-            <a:r>
-              <a:rPr lang="en-US" dirty="0"/>
-              <a:t>Evaluation</a:t>
-            </a:r>
-          </a:p>
-        </p:txBody>
-      </p:sp>
-    </p:spTree>
-    <p:extLst>
-      <p:ext uri="{BB962C8B-B14F-4D97-AF65-F5344CB8AC3E}">
-        <p14:creationId xmlns:p14="http://schemas.microsoft.com/office/powerpoint/2010/main" val="1668790669"/>
-      </p:ext>
-    </p:extLst>
-  </p:cSld>
-  <p:clrMapOvr>
-    <a:masterClrMapping/>
-  </p:clrMapOvr>
-</p:sld>
-</file>
-
-<file path=ppt/slides/slide20.xml><?xml version="1.0" encoding="utf-8"?>
+<file path=ppt/slides/slide19.xml><?xml version="1.0" encoding="utf-8"?>
 <p:sld xmlns:a="http://schemas.openxmlformats.org/drawingml/2006/main" xmlns:r="http://schemas.openxmlformats.org/officeDocument/2006/relationships" xmlns:p="http://schemas.openxmlformats.org/presentationml/2006/main">
   <p:cSld>
     <p:spTree>
@@ -6344,7 +6102,129 @@
 </p:sld>
 </file>
 
-<file path=ppt/slides/slide21.xml><?xml version="1.0" encoding="utf-8"?>
+<file path=ppt/slides/slide2.xml><?xml version="1.0" encoding="utf-8"?>
+<p:sld xmlns:a="http://schemas.openxmlformats.org/drawingml/2006/main" xmlns:r="http://schemas.openxmlformats.org/officeDocument/2006/relationships" xmlns:p="http://schemas.openxmlformats.org/presentationml/2006/main">
+  <p:cSld>
+    <p:spTree>
+      <p:nvGrpSpPr>
+        <p:cNvPr id="1" name=""/>
+        <p:cNvGrpSpPr/>
+        <p:nvPr/>
+      </p:nvGrpSpPr>
+      <p:grpSpPr>
+        <a:xfrm>
+          <a:off x="0" y="0"/>
+          <a:ext cx="0" cy="0"/>
+          <a:chOff x="0" y="0"/>
+          <a:chExt cx="0" cy="0"/>
+        </a:xfrm>
+      </p:grpSpPr>
+      <p:sp>
+        <p:nvSpPr>
+          <p:cNvPr id="2" name="Title 1">
+            <a:extLst>
+              <a:ext uri="{FF2B5EF4-FFF2-40B4-BE49-F238E27FC236}">
+                <a16:creationId xmlns:a16="http://schemas.microsoft.com/office/drawing/2014/main" id="{4B46E646-7500-CBFB-037A-9EB81193E760}"/>
+              </a:ext>
+            </a:extLst>
+          </p:cNvPr>
+          <p:cNvSpPr>
+            <a:spLocks noGrp="1"/>
+          </p:cNvSpPr>
+          <p:nvPr>
+            <p:ph type="title"/>
+          </p:nvPr>
+        </p:nvSpPr>
+        <p:spPr/>
+        <p:txBody>
+          <a:bodyPr/>
+          <a:lstStyle/>
+          <a:p>
+            <a:r>
+              <a:rPr lang="en-US" b="1" dirty="0"/>
+              <a:t>Table of content</a:t>
+            </a:r>
+          </a:p>
+        </p:txBody>
+      </p:sp>
+      <p:sp>
+        <p:nvSpPr>
+          <p:cNvPr id="3" name="Content Placeholder 2">
+            <a:extLst>
+              <a:ext uri="{FF2B5EF4-FFF2-40B4-BE49-F238E27FC236}">
+                <a16:creationId xmlns:a16="http://schemas.microsoft.com/office/drawing/2014/main" id="{3CF7D359-EB74-53EC-4131-DBBAA570D528}"/>
+              </a:ext>
+            </a:extLst>
+          </p:cNvPr>
+          <p:cNvSpPr>
+            <a:spLocks noGrp="1"/>
+          </p:cNvSpPr>
+          <p:nvPr>
+            <p:ph idx="1"/>
+          </p:nvPr>
+        </p:nvSpPr>
+        <p:spPr/>
+        <p:txBody>
+          <a:bodyPr/>
+          <a:lstStyle/>
+          <a:p>
+            <a:r>
+              <a:rPr lang="en-US" dirty="0"/>
+              <a:t>Understanding the Problem</a:t>
+            </a:r>
+          </a:p>
+          <a:p>
+            <a:r>
+              <a:rPr lang="en-US" dirty="0"/>
+              <a:t>Scope</a:t>
+            </a:r>
+          </a:p>
+          <a:p>
+            <a:r>
+              <a:rPr lang="en-US" dirty="0"/>
+              <a:t>Features</a:t>
+            </a:r>
+          </a:p>
+          <a:p>
+            <a:r>
+              <a:rPr lang="en-US" dirty="0"/>
+              <a:t>Architecture</a:t>
+            </a:r>
+          </a:p>
+          <a:p>
+            <a:r>
+              <a:rPr lang="en-US" dirty="0"/>
+              <a:t>Prompt Engineering</a:t>
+            </a:r>
+          </a:p>
+          <a:p>
+            <a:r>
+              <a:rPr lang="en-US" dirty="0"/>
+              <a:t>Demo</a:t>
+            </a:r>
+          </a:p>
+          <a:p>
+            <a:r>
+              <a:rPr lang="en-US" dirty="0"/>
+              <a:t>Evaluation</a:t>
+            </a:r>
+          </a:p>
+        </p:txBody>
+      </p:sp>
+    </p:spTree>
+    <p:extLst>
+      <p:ext uri="{BB962C8B-B14F-4D97-AF65-F5344CB8AC3E}">
+        <p14:creationId xmlns:p14="http://schemas.microsoft.com/office/powerpoint/2010/main" val="1668790669"/>
+      </p:ext>
+    </p:extLst>
+  </p:cSld>
+  <p:clrMapOvr>
+    <a:masterClrMapping/>
+  </p:clrMapOvr>
+</p:sld>
+</file>
+
+<file path=ppt/slides/slide20.xml><?xml version="1.0" encoding="utf-8"?>
 <p:sld xmlns:a="http://schemas.openxmlformats.org/drawingml/2006/main" xmlns:r="http://schemas.openxmlformats.org/officeDocument/2006/relationships" xmlns:p="http://schemas.openxmlformats.org/presentationml/2006/main">
   <p:cSld>
     <p:spTree>
@@ -6462,7 +6342,7 @@
 </p:sld>
 </file>
 
-<file path=ppt/slides/slide22.xml><?xml version="1.0" encoding="utf-8"?>
+<file path=ppt/slides/slide21.xml><?xml version="1.0" encoding="utf-8"?>
 <p:sld xmlns:a="http://schemas.openxmlformats.org/drawingml/2006/main" xmlns:r="http://schemas.openxmlformats.org/officeDocument/2006/relationships" xmlns:p="http://schemas.openxmlformats.org/presentationml/2006/main">
   <p:cSld>
     <p:spTree>
@@ -6580,7 +6460,7 @@
 </p:sld>
 </file>
 
-<file path=ppt/slides/slide23.xml><?xml version="1.0" encoding="utf-8"?>
+<file path=ppt/slides/slide22.xml><?xml version="1.0" encoding="utf-8"?>
 <p:sld xmlns:a="http://schemas.openxmlformats.org/drawingml/2006/main" xmlns:r="http://schemas.openxmlformats.org/officeDocument/2006/relationships" xmlns:p="http://schemas.openxmlformats.org/presentationml/2006/main">
   <p:cSld>
     <p:spTree>
@@ -6698,7 +6578,7 @@
 </p:sld>
 </file>
 
-<file path=ppt/slides/slide24.xml><?xml version="1.0" encoding="utf-8"?>
+<file path=ppt/slides/slide23.xml><?xml version="1.0" encoding="utf-8"?>
 <p:sld xmlns:a="http://schemas.openxmlformats.org/drawingml/2006/main" xmlns:r="http://schemas.openxmlformats.org/officeDocument/2006/relationships" xmlns:p="http://schemas.openxmlformats.org/presentationml/2006/main">
   <p:cSld>
     <p:spTree>
@@ -6786,7 +6666,7 @@
 </p:sld>
 </file>
 
-<file path=ppt/slides/slide25.xml><?xml version="1.0" encoding="utf-8"?>
+<file path=ppt/slides/slide24.xml><?xml version="1.0" encoding="utf-8"?>
 <p:sld xmlns:a="http://schemas.openxmlformats.org/drawingml/2006/main" xmlns:r="http://schemas.openxmlformats.org/officeDocument/2006/relationships" xmlns:p="http://schemas.openxmlformats.org/presentationml/2006/main">
   <p:cSld>
     <p:spTree>

</xml_diff>